<commit_message>
3a presentation - more graphics
</commit_message>
<xml_diff>
--- a/docs/presentations/Apresentação 3 - 20211124.pptx
+++ b/docs/presentations/Apresentação 3 - 20211124.pptx
@@ -5,7 +5,7 @@
     <p:sldMasterId id="2147483659" r:id="rId1"/>
   </p:sldMasterIdLst>
   <p:notesMasterIdLst>
-    <p:notesMasterId r:id="rId23"/>
+    <p:notesMasterId r:id="rId26"/>
   </p:notesMasterIdLst>
   <p:sldIdLst>
     <p:sldId id="256" r:id="rId2"/>
@@ -28,7 +28,10 @@
     <p:sldId id="279" r:id="rId19"/>
     <p:sldId id="280" r:id="rId20"/>
     <p:sldId id="261" r:id="rId21"/>
-    <p:sldId id="281" r:id="rId22"/>
+    <p:sldId id="285" r:id="rId22"/>
+    <p:sldId id="286" r:id="rId23"/>
+    <p:sldId id="287" r:id="rId24"/>
+    <p:sldId id="281" r:id="rId25"/>
   </p:sldIdLst>
   <p:sldSz cx="9144000" cy="5143500" type="screen16x9"/>
   <p:notesSz cx="6858000" cy="9144000"/>
@@ -2336,6 +2339,366 @@
 </file>
 
 <file path=ppt/notesSlides/notesSlide21.xml><?xml version="1.0" encoding="utf-8"?>
+<p:notes xmlns:a="http://schemas.openxmlformats.org/drawingml/2006/main" xmlns:r="http://schemas.openxmlformats.org/officeDocument/2006/relationships" xmlns:p="http://schemas.openxmlformats.org/presentationml/2006/main" showMasterSp="0" showMasterPhAnim="0">
+  <p:cSld>
+    <p:spTree>
+      <p:nvGrpSpPr>
+        <p:cNvPr id="1" name="Shape 80"/>
+        <p:cNvGrpSpPr/>
+        <p:nvPr/>
+      </p:nvGrpSpPr>
+      <p:grpSpPr>
+        <a:xfrm>
+          <a:off x="0" y="0"/>
+          <a:ext cx="0" cy="0"/>
+          <a:chOff x="0" y="0"/>
+          <a:chExt cx="0" cy="0"/>
+        </a:xfrm>
+      </p:grpSpPr>
+      <p:sp>
+        <p:nvSpPr>
+          <p:cNvPr id="81" name="Google Shape;81;gf6254c5e42_0_30:notes"/>
+          <p:cNvSpPr>
+            <a:spLocks noGrp="1" noRot="1" noChangeAspect="1"/>
+          </p:cNvSpPr>
+          <p:nvPr>
+            <p:ph type="sldImg" idx="2"/>
+          </p:nvPr>
+        </p:nvSpPr>
+        <p:spPr>
+          <a:xfrm>
+            <a:off x="381000" y="685800"/>
+            <a:ext cx="6096000" cy="3429000"/>
+          </a:xfrm>
+          <a:custGeom>
+            <a:avLst/>
+            <a:gdLst/>
+            <a:ahLst/>
+            <a:cxnLst/>
+            <a:rect l="l" t="t" r="r" b="b"/>
+            <a:pathLst>
+              <a:path w="120000" h="120000" extrusionOk="0">
+                <a:moveTo>
+                  <a:pt x="0" y="0"/>
+                </a:moveTo>
+                <a:lnTo>
+                  <a:pt x="120000" y="0"/>
+                </a:lnTo>
+                <a:lnTo>
+                  <a:pt x="120000" y="120000"/>
+                </a:lnTo>
+                <a:lnTo>
+                  <a:pt x="0" y="120000"/>
+                </a:lnTo>
+                <a:close/>
+              </a:path>
+            </a:pathLst>
+          </a:custGeom>
+        </p:spPr>
+      </p:sp>
+      <p:sp>
+        <p:nvSpPr>
+          <p:cNvPr id="82" name="Google Shape;82;gf6254c5e42_0_30:notes"/>
+          <p:cNvSpPr txBox="1">
+            <a:spLocks noGrp="1"/>
+          </p:cNvSpPr>
+          <p:nvPr>
+            <p:ph type="body" idx="1"/>
+          </p:nvPr>
+        </p:nvSpPr>
+        <p:spPr>
+          <a:xfrm>
+            <a:off x="685800" y="4343400"/>
+            <a:ext cx="5486400" cy="4114800"/>
+          </a:xfrm>
+          <a:prstGeom prst="rect">
+            <a:avLst/>
+          </a:prstGeom>
+        </p:spPr>
+        <p:txBody>
+          <a:bodyPr spcFirstLastPara="1" wrap="square" lIns="91425" tIns="91425" rIns="91425" bIns="91425" anchor="t" anchorCtr="0">
+            <a:noAutofit/>
+          </a:bodyPr>
+          <a:lstStyle/>
+          <a:p>
+            <a:pPr marL="457200" lvl="0" indent="0" algn="l" rtl="0">
+              <a:lnSpc>
+                <a:spcPct val="115000"/>
+              </a:lnSpc>
+              <a:spcBef>
+                <a:spcPts val="0"/>
+              </a:spcBef>
+              <a:spcAft>
+                <a:spcPts val="1200"/>
+              </a:spcAft>
+              <a:buNone/>
+            </a:pPr>
+            <a:r>
+              <a:rPr lang="pt-BR" sz="1800">
+                <a:solidFill>
+                  <a:srgbClr val="595959"/>
+                </a:solidFill>
+              </a:rPr>
+              <a:t>Link para o github</a:t>
+            </a:r>
+            <a:endParaRPr/>
+          </a:p>
+        </p:txBody>
+      </p:sp>
+    </p:spTree>
+    <p:extLst>
+      <p:ext uri="{BB962C8B-B14F-4D97-AF65-F5344CB8AC3E}">
+        <p14:creationId xmlns:p14="http://schemas.microsoft.com/office/powerpoint/2010/main" val="1212036858"/>
+      </p:ext>
+    </p:extLst>
+  </p:cSld>
+  <p:clrMapOvr>
+    <a:masterClrMapping/>
+  </p:clrMapOvr>
+</p:notes>
+</file>
+
+<file path=ppt/notesSlides/notesSlide22.xml><?xml version="1.0" encoding="utf-8"?>
+<p:notes xmlns:a="http://schemas.openxmlformats.org/drawingml/2006/main" xmlns:r="http://schemas.openxmlformats.org/officeDocument/2006/relationships" xmlns:p="http://schemas.openxmlformats.org/presentationml/2006/main" showMasterSp="0" showMasterPhAnim="0">
+  <p:cSld>
+    <p:spTree>
+      <p:nvGrpSpPr>
+        <p:cNvPr id="1" name="Shape 80"/>
+        <p:cNvGrpSpPr/>
+        <p:nvPr/>
+      </p:nvGrpSpPr>
+      <p:grpSpPr>
+        <a:xfrm>
+          <a:off x="0" y="0"/>
+          <a:ext cx="0" cy="0"/>
+          <a:chOff x="0" y="0"/>
+          <a:chExt cx="0" cy="0"/>
+        </a:xfrm>
+      </p:grpSpPr>
+      <p:sp>
+        <p:nvSpPr>
+          <p:cNvPr id="81" name="Google Shape;81;gf6254c5e42_0_30:notes"/>
+          <p:cNvSpPr>
+            <a:spLocks noGrp="1" noRot="1" noChangeAspect="1"/>
+          </p:cNvSpPr>
+          <p:nvPr>
+            <p:ph type="sldImg" idx="2"/>
+          </p:nvPr>
+        </p:nvSpPr>
+        <p:spPr>
+          <a:xfrm>
+            <a:off x="381000" y="685800"/>
+            <a:ext cx="6096000" cy="3429000"/>
+          </a:xfrm>
+          <a:custGeom>
+            <a:avLst/>
+            <a:gdLst/>
+            <a:ahLst/>
+            <a:cxnLst/>
+            <a:rect l="l" t="t" r="r" b="b"/>
+            <a:pathLst>
+              <a:path w="120000" h="120000" extrusionOk="0">
+                <a:moveTo>
+                  <a:pt x="0" y="0"/>
+                </a:moveTo>
+                <a:lnTo>
+                  <a:pt x="120000" y="0"/>
+                </a:lnTo>
+                <a:lnTo>
+                  <a:pt x="120000" y="120000"/>
+                </a:lnTo>
+                <a:lnTo>
+                  <a:pt x="0" y="120000"/>
+                </a:lnTo>
+                <a:close/>
+              </a:path>
+            </a:pathLst>
+          </a:custGeom>
+        </p:spPr>
+      </p:sp>
+      <p:sp>
+        <p:nvSpPr>
+          <p:cNvPr id="82" name="Google Shape;82;gf6254c5e42_0_30:notes"/>
+          <p:cNvSpPr txBox="1">
+            <a:spLocks noGrp="1"/>
+          </p:cNvSpPr>
+          <p:nvPr>
+            <p:ph type="body" idx="1"/>
+          </p:nvPr>
+        </p:nvSpPr>
+        <p:spPr>
+          <a:xfrm>
+            <a:off x="685800" y="4343400"/>
+            <a:ext cx="5486400" cy="4114800"/>
+          </a:xfrm>
+          <a:prstGeom prst="rect">
+            <a:avLst/>
+          </a:prstGeom>
+        </p:spPr>
+        <p:txBody>
+          <a:bodyPr spcFirstLastPara="1" wrap="square" lIns="91425" tIns="91425" rIns="91425" bIns="91425" anchor="t" anchorCtr="0">
+            <a:noAutofit/>
+          </a:bodyPr>
+          <a:lstStyle/>
+          <a:p>
+            <a:pPr marL="457200" lvl="0" indent="0" algn="l" rtl="0">
+              <a:lnSpc>
+                <a:spcPct val="115000"/>
+              </a:lnSpc>
+              <a:spcBef>
+                <a:spcPts val="0"/>
+              </a:spcBef>
+              <a:spcAft>
+                <a:spcPts val="1200"/>
+              </a:spcAft>
+              <a:buNone/>
+            </a:pPr>
+            <a:r>
+              <a:rPr lang="pt-BR" sz="1800">
+                <a:solidFill>
+                  <a:srgbClr val="595959"/>
+                </a:solidFill>
+              </a:rPr>
+              <a:t>Link para o github</a:t>
+            </a:r>
+            <a:endParaRPr/>
+          </a:p>
+        </p:txBody>
+      </p:sp>
+    </p:spTree>
+    <p:extLst>
+      <p:ext uri="{BB962C8B-B14F-4D97-AF65-F5344CB8AC3E}">
+        <p14:creationId xmlns:p14="http://schemas.microsoft.com/office/powerpoint/2010/main" val="897458232"/>
+      </p:ext>
+    </p:extLst>
+  </p:cSld>
+  <p:clrMapOvr>
+    <a:masterClrMapping/>
+  </p:clrMapOvr>
+</p:notes>
+</file>
+
+<file path=ppt/notesSlides/notesSlide23.xml><?xml version="1.0" encoding="utf-8"?>
+<p:notes xmlns:a="http://schemas.openxmlformats.org/drawingml/2006/main" xmlns:r="http://schemas.openxmlformats.org/officeDocument/2006/relationships" xmlns:p="http://schemas.openxmlformats.org/presentationml/2006/main" showMasterSp="0" showMasterPhAnim="0">
+  <p:cSld>
+    <p:spTree>
+      <p:nvGrpSpPr>
+        <p:cNvPr id="1" name="Shape 80"/>
+        <p:cNvGrpSpPr/>
+        <p:nvPr/>
+      </p:nvGrpSpPr>
+      <p:grpSpPr>
+        <a:xfrm>
+          <a:off x="0" y="0"/>
+          <a:ext cx="0" cy="0"/>
+          <a:chOff x="0" y="0"/>
+          <a:chExt cx="0" cy="0"/>
+        </a:xfrm>
+      </p:grpSpPr>
+      <p:sp>
+        <p:nvSpPr>
+          <p:cNvPr id="81" name="Google Shape;81;gf6254c5e42_0_30:notes"/>
+          <p:cNvSpPr>
+            <a:spLocks noGrp="1" noRot="1" noChangeAspect="1"/>
+          </p:cNvSpPr>
+          <p:nvPr>
+            <p:ph type="sldImg" idx="2"/>
+          </p:nvPr>
+        </p:nvSpPr>
+        <p:spPr>
+          <a:xfrm>
+            <a:off x="381000" y="685800"/>
+            <a:ext cx="6096000" cy="3429000"/>
+          </a:xfrm>
+          <a:custGeom>
+            <a:avLst/>
+            <a:gdLst/>
+            <a:ahLst/>
+            <a:cxnLst/>
+            <a:rect l="l" t="t" r="r" b="b"/>
+            <a:pathLst>
+              <a:path w="120000" h="120000" extrusionOk="0">
+                <a:moveTo>
+                  <a:pt x="0" y="0"/>
+                </a:moveTo>
+                <a:lnTo>
+                  <a:pt x="120000" y="0"/>
+                </a:lnTo>
+                <a:lnTo>
+                  <a:pt x="120000" y="120000"/>
+                </a:lnTo>
+                <a:lnTo>
+                  <a:pt x="0" y="120000"/>
+                </a:lnTo>
+                <a:close/>
+              </a:path>
+            </a:pathLst>
+          </a:custGeom>
+        </p:spPr>
+      </p:sp>
+      <p:sp>
+        <p:nvSpPr>
+          <p:cNvPr id="82" name="Google Shape;82;gf6254c5e42_0_30:notes"/>
+          <p:cNvSpPr txBox="1">
+            <a:spLocks noGrp="1"/>
+          </p:cNvSpPr>
+          <p:nvPr>
+            <p:ph type="body" idx="1"/>
+          </p:nvPr>
+        </p:nvSpPr>
+        <p:spPr>
+          <a:xfrm>
+            <a:off x="685800" y="4343400"/>
+            <a:ext cx="5486400" cy="4114800"/>
+          </a:xfrm>
+          <a:prstGeom prst="rect">
+            <a:avLst/>
+          </a:prstGeom>
+        </p:spPr>
+        <p:txBody>
+          <a:bodyPr spcFirstLastPara="1" wrap="square" lIns="91425" tIns="91425" rIns="91425" bIns="91425" anchor="t" anchorCtr="0">
+            <a:noAutofit/>
+          </a:bodyPr>
+          <a:lstStyle/>
+          <a:p>
+            <a:pPr marL="457200" lvl="0" indent="0" algn="l" rtl="0">
+              <a:lnSpc>
+                <a:spcPct val="115000"/>
+              </a:lnSpc>
+              <a:spcBef>
+                <a:spcPts val="0"/>
+              </a:spcBef>
+              <a:spcAft>
+                <a:spcPts val="1200"/>
+              </a:spcAft>
+              <a:buNone/>
+            </a:pPr>
+            <a:r>
+              <a:rPr lang="pt-BR" sz="1800">
+                <a:solidFill>
+                  <a:srgbClr val="595959"/>
+                </a:solidFill>
+              </a:rPr>
+              <a:t>Link para o github</a:t>
+            </a:r>
+            <a:endParaRPr/>
+          </a:p>
+        </p:txBody>
+      </p:sp>
+    </p:spTree>
+    <p:extLst>
+      <p:ext uri="{BB962C8B-B14F-4D97-AF65-F5344CB8AC3E}">
+        <p14:creationId xmlns:p14="http://schemas.microsoft.com/office/powerpoint/2010/main" val="2481974844"/>
+      </p:ext>
+    </p:extLst>
+  </p:cSld>
+  <p:clrMapOvr>
+    <a:masterClrMapping/>
+  </p:clrMapOvr>
+</p:notes>
+</file>
+
+<file path=ppt/notesSlides/notesSlide24.xml><?xml version="1.0" encoding="utf-8"?>
 <p:notes xmlns:a="http://schemas.openxmlformats.org/drawingml/2006/main" xmlns:r="http://schemas.openxmlformats.org/officeDocument/2006/relationships" xmlns:p="http://schemas.openxmlformats.org/presentationml/2006/main" showMasterSp="0" showMasterPhAnim="0">
   <p:cSld>
     <p:spTree>
@@ -17346,6 +17709,360 @@
         </p:nvSpPr>
         <p:spPr>
           <a:xfrm>
+            <a:off x="0" y="0"/>
+            <a:ext cx="8520600" cy="572700"/>
+          </a:xfrm>
+          <a:prstGeom prst="rect">
+            <a:avLst/>
+          </a:prstGeom>
+        </p:spPr>
+        <p:txBody>
+          <a:bodyPr spcFirstLastPara="1" wrap="square" lIns="91425" tIns="91425" rIns="91425" bIns="91425" anchor="t" anchorCtr="0">
+            <a:normAutofit/>
+          </a:bodyPr>
+          <a:lstStyle/>
+          <a:p>
+            <a:pPr marL="0" lvl="0" indent="0" algn="l" rtl="0">
+              <a:spcBef>
+                <a:spcPts val="0"/>
+              </a:spcBef>
+              <a:spcAft>
+                <a:spcPts val="0"/>
+              </a:spcAft>
+              <a:buNone/>
+            </a:pPr>
+            <a:r>
+              <a:rPr lang="pt-BR" sz="1400" dirty="0"/>
+              <a:t>Resultados preliminares...</a:t>
+            </a:r>
+          </a:p>
+        </p:txBody>
+      </p:sp>
+      <p:pic>
+        <p:nvPicPr>
+          <p:cNvPr id="2050" name="Picture 2" descr="imagem">
+            <a:extLst>
+              <a:ext uri="{FF2B5EF4-FFF2-40B4-BE49-F238E27FC236}">
+                <a16:creationId xmlns:a16="http://schemas.microsoft.com/office/drawing/2014/main" id="{2C5972A1-F89C-472D-B394-A5A86BB27EC4}"/>
+              </a:ext>
+            </a:extLst>
+          </p:cNvPr>
+          <p:cNvPicPr>
+            <a:picLocks noChangeAspect="1" noChangeArrowheads="1"/>
+          </p:cNvPicPr>
+          <p:nvPr/>
+        </p:nvPicPr>
+        <p:blipFill>
+          <a:blip r:embed="rId3">
+            <a:extLst>
+              <a:ext uri="{28A0092B-C50C-407E-A947-70E740481C1C}">
+                <a14:useLocalDpi xmlns:a14="http://schemas.microsoft.com/office/drawing/2010/main" val="0"/>
+              </a:ext>
+            </a:extLst>
+          </a:blip>
+          <a:srcRect/>
+          <a:stretch>
+            <a:fillRect/>
+          </a:stretch>
+        </p:blipFill>
+        <p:spPr bwMode="auto">
+          <a:xfrm>
+            <a:off x="2282825" y="0"/>
+            <a:ext cx="5186363" cy="5143500"/>
+          </a:xfrm>
+          <a:prstGeom prst="rect">
+            <a:avLst/>
+          </a:prstGeom>
+          <a:noFill/>
+          <a:extLst>
+            <a:ext uri="{909E8E84-426E-40DD-AFC4-6F175D3DCCD1}">
+              <a14:hiddenFill xmlns:a14="http://schemas.microsoft.com/office/drawing/2010/main">
+                <a:solidFill>
+                  <a:srgbClr val="FFFFFF"/>
+                </a:solidFill>
+              </a14:hiddenFill>
+            </a:ext>
+          </a:extLst>
+        </p:spPr>
+      </p:pic>
+    </p:spTree>
+    <p:extLst>
+      <p:ext uri="{BB962C8B-B14F-4D97-AF65-F5344CB8AC3E}">
+        <p14:creationId xmlns:p14="http://schemas.microsoft.com/office/powerpoint/2010/main" val="577401951"/>
+      </p:ext>
+    </p:extLst>
+  </p:cSld>
+  <p:clrMapOvr>
+    <a:masterClrMapping/>
+  </p:clrMapOvr>
+</p:sld>
+</file>
+
+<file path=ppt/slides/slide22.xml><?xml version="1.0" encoding="utf-8"?>
+<p:sld xmlns:a="http://schemas.openxmlformats.org/drawingml/2006/main" xmlns:r="http://schemas.openxmlformats.org/officeDocument/2006/relationships" xmlns:p="http://schemas.openxmlformats.org/presentationml/2006/main">
+  <p:cSld>
+    <p:spTree>
+      <p:nvGrpSpPr>
+        <p:cNvPr id="1" name="Shape 83"/>
+        <p:cNvGrpSpPr/>
+        <p:nvPr/>
+      </p:nvGrpSpPr>
+      <p:grpSpPr>
+        <a:xfrm>
+          <a:off x="0" y="0"/>
+          <a:ext cx="0" cy="0"/>
+          <a:chOff x="0" y="0"/>
+          <a:chExt cx="0" cy="0"/>
+        </a:xfrm>
+      </p:grpSpPr>
+      <p:sp>
+        <p:nvSpPr>
+          <p:cNvPr id="84" name="Google Shape;84;p18"/>
+          <p:cNvSpPr txBox="1">
+            <a:spLocks noGrp="1"/>
+          </p:cNvSpPr>
+          <p:nvPr>
+            <p:ph type="title"/>
+          </p:nvPr>
+        </p:nvSpPr>
+        <p:spPr>
+          <a:xfrm>
+            <a:off x="0" y="0"/>
+            <a:ext cx="8520600" cy="572700"/>
+          </a:xfrm>
+          <a:prstGeom prst="rect">
+            <a:avLst/>
+          </a:prstGeom>
+        </p:spPr>
+        <p:txBody>
+          <a:bodyPr spcFirstLastPara="1" wrap="square" lIns="91425" tIns="91425" rIns="91425" bIns="91425" anchor="t" anchorCtr="0">
+            <a:normAutofit/>
+          </a:bodyPr>
+          <a:lstStyle/>
+          <a:p>
+            <a:pPr marL="0" lvl="0" indent="0" algn="l" rtl="0">
+              <a:spcBef>
+                <a:spcPts val="0"/>
+              </a:spcBef>
+              <a:spcAft>
+                <a:spcPts val="0"/>
+              </a:spcAft>
+              <a:buNone/>
+            </a:pPr>
+            <a:r>
+              <a:rPr lang="pt-BR" sz="1400" dirty="0"/>
+              <a:t>Resultados preliminares...</a:t>
+            </a:r>
+          </a:p>
+        </p:txBody>
+      </p:sp>
+      <p:pic>
+        <p:nvPicPr>
+          <p:cNvPr id="3074" name="Picture 2" descr="imagem">
+            <a:extLst>
+              <a:ext uri="{FF2B5EF4-FFF2-40B4-BE49-F238E27FC236}">
+                <a16:creationId xmlns:a16="http://schemas.microsoft.com/office/drawing/2014/main" id="{F2207309-C4F1-4F25-8483-4E832ABFEFC1}"/>
+              </a:ext>
+            </a:extLst>
+          </p:cNvPr>
+          <p:cNvPicPr>
+            <a:picLocks noChangeAspect="1" noChangeArrowheads="1"/>
+          </p:cNvPicPr>
+          <p:nvPr/>
+        </p:nvPicPr>
+        <p:blipFill>
+          <a:blip r:embed="rId3">
+            <a:extLst>
+              <a:ext uri="{28A0092B-C50C-407E-A947-70E740481C1C}">
+                <a14:useLocalDpi xmlns:a14="http://schemas.microsoft.com/office/drawing/2010/main" val="0"/>
+              </a:ext>
+            </a:extLst>
+          </a:blip>
+          <a:srcRect/>
+          <a:stretch>
+            <a:fillRect/>
+          </a:stretch>
+        </p:blipFill>
+        <p:spPr bwMode="auto">
+          <a:xfrm>
+            <a:off x="244475" y="304800"/>
+            <a:ext cx="8653463" cy="4838700"/>
+          </a:xfrm>
+          <a:prstGeom prst="rect">
+            <a:avLst/>
+          </a:prstGeom>
+          <a:noFill/>
+          <a:extLst>
+            <a:ext uri="{909E8E84-426E-40DD-AFC4-6F175D3DCCD1}">
+              <a14:hiddenFill xmlns:a14="http://schemas.microsoft.com/office/drawing/2010/main">
+                <a:solidFill>
+                  <a:srgbClr val="FFFFFF"/>
+                </a:solidFill>
+              </a14:hiddenFill>
+            </a:ext>
+          </a:extLst>
+        </p:spPr>
+      </p:pic>
+    </p:spTree>
+    <p:extLst>
+      <p:ext uri="{BB962C8B-B14F-4D97-AF65-F5344CB8AC3E}">
+        <p14:creationId xmlns:p14="http://schemas.microsoft.com/office/powerpoint/2010/main" val="3439232015"/>
+      </p:ext>
+    </p:extLst>
+  </p:cSld>
+  <p:clrMapOvr>
+    <a:masterClrMapping/>
+  </p:clrMapOvr>
+</p:sld>
+</file>
+
+<file path=ppt/slides/slide23.xml><?xml version="1.0" encoding="utf-8"?>
+<p:sld xmlns:a="http://schemas.openxmlformats.org/drawingml/2006/main" xmlns:r="http://schemas.openxmlformats.org/officeDocument/2006/relationships" xmlns:p="http://schemas.openxmlformats.org/presentationml/2006/main">
+  <p:cSld>
+    <p:spTree>
+      <p:nvGrpSpPr>
+        <p:cNvPr id="1" name="Shape 83"/>
+        <p:cNvGrpSpPr/>
+        <p:nvPr/>
+      </p:nvGrpSpPr>
+      <p:grpSpPr>
+        <a:xfrm>
+          <a:off x="0" y="0"/>
+          <a:ext cx="0" cy="0"/>
+          <a:chOff x="0" y="0"/>
+          <a:chExt cx="0" cy="0"/>
+        </a:xfrm>
+      </p:grpSpPr>
+      <p:sp>
+        <p:nvSpPr>
+          <p:cNvPr id="84" name="Google Shape;84;p18"/>
+          <p:cNvSpPr txBox="1">
+            <a:spLocks noGrp="1"/>
+          </p:cNvSpPr>
+          <p:nvPr>
+            <p:ph type="title"/>
+          </p:nvPr>
+        </p:nvSpPr>
+        <p:spPr>
+          <a:xfrm>
+            <a:off x="0" y="0"/>
+            <a:ext cx="8520600" cy="572700"/>
+          </a:xfrm>
+          <a:prstGeom prst="rect">
+            <a:avLst/>
+          </a:prstGeom>
+        </p:spPr>
+        <p:txBody>
+          <a:bodyPr spcFirstLastPara="1" wrap="square" lIns="91425" tIns="91425" rIns="91425" bIns="91425" anchor="t" anchorCtr="0">
+            <a:normAutofit/>
+          </a:bodyPr>
+          <a:lstStyle/>
+          <a:p>
+            <a:pPr marL="0" lvl="0" indent="0" algn="l" rtl="0">
+              <a:spcBef>
+                <a:spcPts val="0"/>
+              </a:spcBef>
+              <a:spcAft>
+                <a:spcPts val="0"/>
+              </a:spcAft>
+              <a:buNone/>
+            </a:pPr>
+            <a:r>
+              <a:rPr lang="pt-BR" sz="1400" dirty="0"/>
+              <a:t>Resultados preliminares...</a:t>
+            </a:r>
+          </a:p>
+        </p:txBody>
+      </p:sp>
+      <p:pic>
+        <p:nvPicPr>
+          <p:cNvPr id="4100" name="Picture 4" descr="imagem">
+            <a:extLst>
+              <a:ext uri="{FF2B5EF4-FFF2-40B4-BE49-F238E27FC236}">
+                <a16:creationId xmlns:a16="http://schemas.microsoft.com/office/drawing/2014/main" id="{3A2D347D-A2BA-420A-940B-1B4D9875B0CA}"/>
+              </a:ext>
+            </a:extLst>
+          </p:cNvPr>
+          <p:cNvPicPr>
+            <a:picLocks noChangeAspect="1" noChangeArrowheads="1"/>
+          </p:cNvPicPr>
+          <p:nvPr/>
+        </p:nvPicPr>
+        <p:blipFill>
+          <a:blip r:embed="rId3">
+            <a:extLst>
+              <a:ext uri="{28A0092B-C50C-407E-A947-70E740481C1C}">
+                <a14:useLocalDpi xmlns:a14="http://schemas.microsoft.com/office/drawing/2010/main" val="0"/>
+              </a:ext>
+            </a:extLst>
+          </a:blip>
+          <a:srcRect/>
+          <a:stretch>
+            <a:fillRect/>
+          </a:stretch>
+        </p:blipFill>
+        <p:spPr bwMode="auto">
+          <a:xfrm>
+            <a:off x="2468563" y="0"/>
+            <a:ext cx="4206875" cy="5143500"/>
+          </a:xfrm>
+          <a:prstGeom prst="rect">
+            <a:avLst/>
+          </a:prstGeom>
+          <a:noFill/>
+          <a:extLst>
+            <a:ext uri="{909E8E84-426E-40DD-AFC4-6F175D3DCCD1}">
+              <a14:hiddenFill xmlns:a14="http://schemas.microsoft.com/office/drawing/2010/main">
+                <a:solidFill>
+                  <a:srgbClr val="FFFFFF"/>
+                </a:solidFill>
+              </a14:hiddenFill>
+            </a:ext>
+          </a:extLst>
+        </p:spPr>
+      </p:pic>
+    </p:spTree>
+    <p:extLst>
+      <p:ext uri="{BB962C8B-B14F-4D97-AF65-F5344CB8AC3E}">
+        <p14:creationId xmlns:p14="http://schemas.microsoft.com/office/powerpoint/2010/main" val="3712770501"/>
+      </p:ext>
+    </p:extLst>
+  </p:cSld>
+  <p:clrMapOvr>
+    <a:masterClrMapping/>
+  </p:clrMapOvr>
+</p:sld>
+</file>
+
+<file path=ppt/slides/slide24.xml><?xml version="1.0" encoding="utf-8"?>
+<p:sld xmlns:a="http://schemas.openxmlformats.org/drawingml/2006/main" xmlns:r="http://schemas.openxmlformats.org/officeDocument/2006/relationships" xmlns:p="http://schemas.openxmlformats.org/presentationml/2006/main">
+  <p:cSld>
+    <p:spTree>
+      <p:nvGrpSpPr>
+        <p:cNvPr id="1" name="Shape 83"/>
+        <p:cNvGrpSpPr/>
+        <p:nvPr/>
+      </p:nvGrpSpPr>
+      <p:grpSpPr>
+        <a:xfrm>
+          <a:off x="0" y="0"/>
+          <a:ext cx="0" cy="0"/>
+          <a:chOff x="0" y="0"/>
+          <a:chExt cx="0" cy="0"/>
+        </a:xfrm>
+      </p:grpSpPr>
+      <p:sp>
+        <p:nvSpPr>
+          <p:cNvPr id="84" name="Google Shape;84;p18"/>
+          <p:cNvSpPr txBox="1">
+            <a:spLocks noGrp="1"/>
+          </p:cNvSpPr>
+          <p:nvPr>
+            <p:ph type="title"/>
+          </p:nvPr>
+        </p:nvSpPr>
+        <p:spPr>
+          <a:xfrm>
             <a:off x="311700" y="445025"/>
             <a:ext cx="8520600" cy="572700"/>
           </a:xfrm>

</xml_diff>

<commit_message>
3a presentation - adjusted
</commit_message>
<xml_diff>
--- a/docs/presentations/Apresentação 3 - 20211124.pptx
+++ b/docs/presentations/Apresentação 3 - 20211124.pptx
@@ -18282,7 +18282,7 @@
         </p:spPr>
         <p:txBody>
           <a:bodyPr spcFirstLastPara="1" wrap="square" lIns="91425" tIns="91425" rIns="91425" bIns="91425" anchor="t" anchorCtr="0">
-            <a:normAutofit lnSpcReduction="10000"/>
+            <a:normAutofit/>
           </a:bodyPr>
           <a:lstStyle/>
           <a:p>
@@ -18310,16 +18310,36 @@
             <a:endParaRPr dirty="0"/>
           </a:p>
           <a:p>
-            <a:pPr marL="0" lvl="0" indent="0" algn="l" rtl="0">
+            <a:pPr marL="0" indent="0">
               <a:spcBef>
                 <a:spcPts val="1200"/>
               </a:spcBef>
-              <a:spcAft>
-                <a:spcPts val="0"/>
-              </a:spcAft>
               <a:buNone/>
             </a:pPr>
-            <a:endParaRPr lang="pt-BR" dirty="0"/>
+            <a:r>
+              <a:rPr lang="pt-BR" dirty="0">
+                <a:solidFill>
+                  <a:schemeClr val="accent1"/>
+                </a:solidFill>
+              </a:rPr>
+              <a:t>(Feito) </a:t>
+            </a:r>
+            <a:r>
+              <a:rPr lang="pt-BR" dirty="0"/>
+              <a:t>Implementação dos ruídos e geração de “</a:t>
+            </a:r>
+            <a:r>
+              <a:rPr lang="pt-BR" dirty="0" err="1"/>
+              <a:t>noisy</a:t>
+            </a:r>
+            <a:r>
+              <a:rPr lang="pt-BR" dirty="0"/>
+              <a:t> queries</a:t>
+            </a:r>
+            <a:r>
+              <a:rPr lang="pt-BR" u="sng" dirty="0"/>
+              <a:t>”;</a:t>
+            </a:r>
           </a:p>
           <a:p>
             <a:pPr marL="0" indent="0">
@@ -18340,17 +18360,6 @@
               <a:rPr lang="pt-BR" dirty="0"/>
               <a:t>Execução sobre as queries com ruído;</a:t>
             </a:r>
-          </a:p>
-          <a:p>
-            <a:pPr marL="0" lvl="0" indent="0" algn="l" rtl="0">
-              <a:spcBef>
-                <a:spcPts val="1200"/>
-              </a:spcBef>
-              <a:spcAft>
-                <a:spcPts val="1200"/>
-              </a:spcAft>
-              <a:buNone/>
-            </a:pPr>
             <a:endParaRPr lang="pt-BR" sz="100" dirty="0">
               <a:solidFill>
                 <a:schemeClr val="accent4">

</xml_diff>